<commit_message>
added new videos, fixed setup.py
</commit_message>
<xml_diff>
--- a/slides/12_paketierung.pptx
+++ b/slides/12_paketierung.pptx
@@ -219,7 +219,7 @@
             <a:fld id="{764ED9EE-8F2A-4E06-87A2-36C0DD0993FD}" type="datetime1">
               <a:rPr lang="de-DE" smtClean="0"/>
               <a:pPr rtl="0"/>
-              <a:t>14.01.2021</a:t>
+              <a:t>12.04.2021</a:t>
             </a:fld>
             <a:endParaRPr lang="en-US" dirty="0"/>
           </a:p>
@@ -391,7 +391,7 @@
             <a:fld id="{A5A5ADE8-1FB8-43FD-A675-2B613EE00B6F}" type="datetime1">
               <a:rPr lang="de-DE" smtClean="0"/>
               <a:pPr rtl="0"/>
-              <a:t>14.01.2021</a:t>
+              <a:t>12.04.2021</a:t>
             </a:fld>
             <a:endParaRPr lang="en-US"/>
           </a:p>
@@ -907,7 +907,7 @@
             <a:fld id="{81E9C95E-BEF0-4D2E-9127-B9099B238D2A}" type="datetime1">
               <a:rPr lang="de-DE" smtClean="0"/>
               <a:pPr rtl="0"/>
-              <a:t>14.01.2021</a:t>
+              <a:t>12.04.2021</a:t>
             </a:fld>
             <a:endParaRPr lang="en-US" dirty="0"/>
           </a:p>
@@ -1116,7 +1116,7 @@
             <a:fld id="{FE771757-BB18-44C5-813E-435E78C98126}" type="datetime1">
               <a:rPr lang="de-DE" smtClean="0"/>
               <a:pPr rtl="0"/>
-              <a:t>14.01.2021</a:t>
+              <a:t>12.04.2021</a:t>
             </a:fld>
             <a:endParaRPr lang="en-US" dirty="0"/>
           </a:p>
@@ -1484,7 +1484,7 @@
             <a:fld id="{B83FACD6-565C-4118-ACD0-32ACCA9AF940}" type="datetime1">
               <a:rPr lang="de-DE" smtClean="0"/>
               <a:pPr rtl="0"/>
-              <a:t>14.01.2021</a:t>
+              <a:t>12.04.2021</a:t>
             </a:fld>
             <a:endParaRPr lang="en-US" dirty="0"/>
           </a:p>
@@ -1688,7 +1688,7 @@
             <a:fld id="{83627DD0-092D-4AD9-AAE0-0513E170352E}" type="datetime1">
               <a:rPr lang="de-DE" smtClean="0"/>
               <a:pPr rtl="0"/>
-              <a:t>14.01.2021</a:t>
+              <a:t>12.04.2021</a:t>
             </a:fld>
             <a:endParaRPr lang="en-US" dirty="0"/>
           </a:p>
@@ -2006,7 +2006,7 @@
             <a:fld id="{F36CBEDB-B1DE-4F8C-AD4A-10AD3F77E1A9}" type="datetime1">
               <a:rPr lang="de-DE" smtClean="0"/>
               <a:pPr rtl="0"/>
-              <a:t>14.01.2021</a:t>
+              <a:t>12.04.2021</a:t>
             </a:fld>
             <a:endParaRPr lang="en-US" dirty="0"/>
           </a:p>
@@ -2265,7 +2265,7 @@
             <a:fld id="{F95AE019-BB99-4C3A-AA2C-A36C39CE4DCB}" type="datetime1">
               <a:rPr lang="de-DE" smtClean="0"/>
               <a:pPr rtl="0"/>
-              <a:t>14.01.2021</a:t>
+              <a:t>12.04.2021</a:t>
             </a:fld>
             <a:endParaRPr lang="en-US" dirty="0"/>
           </a:p>
@@ -2693,7 +2693,7 @@
             <a:fld id="{117FAFC6-AD0C-4B5B-B8B0-E729C6D4C810}" type="datetime1">
               <a:rPr lang="de-DE" smtClean="0"/>
               <a:pPr rtl="0"/>
-              <a:t>14.01.2021</a:t>
+              <a:t>12.04.2021</a:t>
             </a:fld>
             <a:endParaRPr lang="en-US" dirty="0"/>
           </a:p>
@@ -2822,7 +2822,7 @@
             <a:fld id="{607DEF3C-A2B0-4F78-836D-1A1B1DEE5467}" type="datetime1">
               <a:rPr lang="de-DE" smtClean="0"/>
               <a:pPr rtl="0"/>
-              <a:t>14.01.2021</a:t>
+              <a:t>12.04.2021</a:t>
             </a:fld>
             <a:endParaRPr lang="en-US" dirty="0"/>
           </a:p>
@@ -2922,7 +2922,7 @@
             <a:fld id="{D971D44B-9C44-467E-B481-41466CDBD2A7}" type="datetime1">
               <a:rPr lang="de-DE" smtClean="0"/>
               <a:pPr rtl="0"/>
-              <a:t>14.01.2021</a:t>
+              <a:t>12.04.2021</a:t>
             </a:fld>
             <a:endParaRPr lang="en-US" dirty="0"/>
           </a:p>
@@ -3305,7 +3305,7 @@
             <a:fld id="{0354EEBD-0E7F-42E6-BE86-4864547D749E}" type="datetime1">
               <a:rPr lang="de-DE" smtClean="0"/>
               <a:pPr rtl="0"/>
-              <a:t>14.01.2021</a:t>
+              <a:t>12.04.2021</a:t>
             </a:fld>
             <a:endParaRPr lang="en-US" dirty="0"/>
           </a:p>
@@ -3604,7 +3604,7 @@
             <a:fld id="{8C7274EF-79A2-4EAD-98EF-7E5BB5EA068D}" type="datetime1">
               <a:rPr lang="de-DE" smtClean="0"/>
               <a:pPr rtl="0"/>
-              <a:t>14.01.2021</a:t>
+              <a:t>12.04.2021</a:t>
             </a:fld>
             <a:endParaRPr lang="en-US" dirty="0"/>
           </a:p>
@@ -3824,7 +3824,7 @@
             <a:fld id="{EDD379EC-906B-4CE5-98C2-3A156331FD9E}" type="datetime1">
               <a:rPr lang="de-DE" smtClean="0"/>
               <a:pPr rtl="0"/>
-              <a:t>14.01.2021</a:t>
+              <a:t>12.04.2021</a:t>
             </a:fld>
             <a:endParaRPr lang="en-US" dirty="0"/>
           </a:p>
@@ -4891,22 +4891,7 @@
           <a:p>
             <a:r>
               <a:rPr lang="de-DE" dirty="0"/>
-              <a:t>Entfernen nicht benutzter Bibliotheken mit </a:t>
-            </a:r>
-            <a:r>
-              <a:rPr lang="de-DE" i="1" dirty="0" err="1"/>
-              <a:t>pyFlake</a:t>
-            </a:r>
-            <a:endParaRPr lang="de-DE" i="1" dirty="0"/>
-          </a:p>
-          <a:p>
-            <a:r>
-              <a:rPr lang="de-DE"/>
-              <a:t>Einfrieren </a:t>
-            </a:r>
-            <a:r>
-              <a:rPr lang="de-DE" dirty="0"/>
-              <a:t>des </a:t>
+              <a:t>Einfrieren des </a:t>
             </a:r>
             <a:r>
               <a:rPr lang="de-DE" dirty="0" err="1"/>
@@ -4916,6 +4901,17 @@
               <a:rPr lang="de-DE" dirty="0"/>
               <a:t> Environment und wiederherstellen in einer neuen Umgebung</a:t>
             </a:r>
+          </a:p>
+          <a:p>
+            <a:r>
+              <a:rPr lang="de-DE" dirty="0"/>
+              <a:t>Paketieren einer Anwendung über </a:t>
+            </a:r>
+            <a:r>
+              <a:rPr lang="de-DE" dirty="0" err="1"/>
+              <a:t>cx_freeze</a:t>
+            </a:r>
+            <a:endParaRPr lang="de-DE" dirty="0"/>
           </a:p>
         </p:txBody>
       </p:sp>
@@ -5233,7 +5229,7 @@
             <a:fld id="{83627DD0-092D-4AD9-AAE0-0513E170352E}" type="datetime1">
               <a:rPr lang="de-DE" smtClean="0"/>
               <a:pPr rtl="0"/>
-              <a:t>14.01.2021</a:t>
+              <a:t>12.04.2021</a:t>
             </a:fld>
             <a:endParaRPr lang="en-US" dirty="0"/>
           </a:p>
@@ -5254,14 +5250,14 @@
           <p:nvPr>
             <p:extLst>
               <p:ext uri="{D42A27DB-BD31-4B8C-83A1-F6EECF244321}">
-                <p14:modId xmlns:p14="http://schemas.microsoft.com/office/powerpoint/2010/main" val="3808822351"/>
+                <p14:modId xmlns:p14="http://schemas.microsoft.com/office/powerpoint/2010/main" val="3668017489"/>
               </p:ext>
             </p:extLst>
           </p:nvPr>
         </p:nvGraphicFramePr>
         <p:xfrm>
           <a:off x="324614" y="2852674"/>
-          <a:ext cx="11397404" cy="3296920"/>
+          <a:ext cx="11397405" cy="3114040"/>
         </p:xfrm>
         <a:graphic>
           <a:graphicData uri="http://schemas.openxmlformats.org/drawingml/2006/table">
@@ -5270,31 +5266,38 @@
                 <a:tableStyleId>{69012ECD-51FC-41F1-AA8D-1B2483CD663E}</a:tableStyleId>
               </a:tblPr>
               <a:tblGrid>
-                <a:gridCol w="1520387">
+                <a:gridCol w="1216310">
                   <a:extLst>
                     <a:ext uri="{9D8B030D-6E8A-4147-A177-3AD203B41FA5}">
                       <a16:colId xmlns:a16="http://schemas.microsoft.com/office/drawing/2014/main" val="1365344574"/>
                     </a:ext>
                   </a:extLst>
                 </a:gridCol>
-                <a:gridCol w="2880382">
+                <a:gridCol w="2304306">
                   <a:extLst>
                     <a:ext uri="{9D8B030D-6E8A-4147-A177-3AD203B41FA5}">
                       <a16:colId xmlns:a16="http://schemas.microsoft.com/office/drawing/2014/main" val="1931494702"/>
                     </a:ext>
                   </a:extLst>
                 </a:gridCol>
-                <a:gridCol w="4147284">
+                <a:gridCol w="3317827">
                   <a:extLst>
                     <a:ext uri="{9D8B030D-6E8A-4147-A177-3AD203B41FA5}">
                       <a16:colId xmlns:a16="http://schemas.microsoft.com/office/drawing/2014/main" val="3607176229"/>
                     </a:ext>
                   </a:extLst>
                 </a:gridCol>
-                <a:gridCol w="2849351">
+                <a:gridCol w="2279481">
                   <a:extLst>
                     <a:ext uri="{9D8B030D-6E8A-4147-A177-3AD203B41FA5}">
                       <a16:colId xmlns:a16="http://schemas.microsoft.com/office/drawing/2014/main" val="162312057"/>
+                    </a:ext>
+                  </a:extLst>
+                </a:gridCol>
+                <a:gridCol w="2279481">
+                  <a:extLst>
+                    <a:ext uri="{9D8B030D-6E8A-4147-A177-3AD203B41FA5}">
+                      <a16:colId xmlns:a16="http://schemas.microsoft.com/office/drawing/2014/main" val="2434110392"/>
                     </a:ext>
                   </a:extLst>
                 </a:gridCol>
@@ -5305,7 +5308,7 @@
                     <a:bodyPr/>
                     <a:lstStyle/>
                     <a:p>
-                      <a:endParaRPr lang="de-DE"/>
+                      <a:endParaRPr lang="de-DE" sz="1400"/>
                     </a:p>
                   </a:txBody>
                   <a:tcPr/>
@@ -5316,18 +5319,18 @@
                     <a:lstStyle/>
                     <a:p>
                       <a:r>
-                        <a:rPr lang="de-DE" dirty="0" err="1"/>
+                        <a:rPr lang="de-DE" sz="1400" dirty="0" err="1"/>
                         <a:t>Conda</a:t>
                       </a:r>
                       <a:r>
-                        <a:rPr lang="de-DE" dirty="0"/>
+                        <a:rPr lang="de-DE" sz="1400" dirty="0"/>
                         <a:t> </a:t>
                       </a:r>
                       <a:r>
-                        <a:rPr lang="de-DE" dirty="0" err="1"/>
+                        <a:rPr lang="de-DE" sz="1400" dirty="0" err="1"/>
                         <a:t>Constructor</a:t>
                       </a:r>
-                      <a:endParaRPr lang="de-DE" dirty="0"/>
+                      <a:endParaRPr lang="de-DE" sz="1400" dirty="0"/>
                     </a:p>
                   </a:txBody>
                   <a:tcPr/>
@@ -5338,10 +5341,10 @@
                     <a:lstStyle/>
                     <a:p>
                       <a:r>
-                        <a:rPr lang="de-DE" dirty="0" err="1"/>
+                        <a:rPr lang="de-DE" sz="1400" dirty="0" err="1"/>
                         <a:t>PyInstaller</a:t>
                       </a:r>
-                      <a:endParaRPr lang="de-DE" dirty="0"/>
+                      <a:endParaRPr lang="de-DE" sz="1400" dirty="0"/>
                     </a:p>
                   </a:txBody>
                   <a:tcPr/>
@@ -5352,13 +5355,27 @@
                     <a:lstStyle/>
                     <a:p>
                       <a:r>
-                        <a:rPr lang="de-DE" dirty="0" err="1"/>
+                        <a:rPr lang="de-DE" sz="1400" dirty="0" err="1"/>
                         <a:t>Git</a:t>
                       </a:r>
                       <a:r>
-                        <a:rPr lang="de-DE" dirty="0"/>
+                        <a:rPr lang="de-DE" sz="1400" dirty="0"/>
                         <a:t> Repository</a:t>
                       </a:r>
+                    </a:p>
+                  </a:txBody>
+                  <a:tcPr/>
+                </a:tc>
+                <a:tc>
+                  <a:txBody>
+                    <a:bodyPr/>
+                    <a:lstStyle/>
+                    <a:p>
+                      <a:r>
+                        <a:rPr lang="de-DE" sz="1400" dirty="0" err="1"/>
+                        <a:t>cx_Freeze</a:t>
+                      </a:r>
+                      <a:endParaRPr lang="de-DE" sz="1400" dirty="0"/>
                     </a:p>
                   </a:txBody>
                   <a:tcPr/>
@@ -5376,7 +5393,7 @@
                     <a:lstStyle/>
                     <a:p>
                       <a:r>
-                        <a:rPr lang="de-DE" b="1" dirty="0"/>
+                        <a:rPr lang="de-DE" sz="1400" b="1" dirty="0"/>
                         <a:t>Vorteile</a:t>
                       </a:r>
                     </a:p>
@@ -5393,7 +5410,7 @@
                         <a:buChar char="•"/>
                       </a:pPr>
                       <a:r>
-                        <a:rPr lang="de-DE" dirty="0"/>
+                        <a:rPr lang="de-DE" sz="1400" dirty="0"/>
                         <a:t>Abgeschlossenes Paket mit allen benötigten Dateien</a:t>
                       </a:r>
                     </a:p>
@@ -5403,11 +5420,11 @@
                         <a:buChar char="•"/>
                       </a:pPr>
                       <a:r>
-                        <a:rPr lang="de-DE" dirty="0" err="1"/>
+                        <a:rPr lang="de-DE" sz="1400" dirty="0" err="1"/>
                         <a:t>Anaconda</a:t>
                       </a:r>
                       <a:r>
-                        <a:rPr lang="de-DE" dirty="0"/>
+                        <a:rPr lang="de-DE" sz="1400" dirty="0"/>
                         <a:t> wird mitgeliefert</a:t>
                       </a:r>
                     </a:p>
@@ -5431,7 +5448,7 @@
                         <a:buChar char="•"/>
                       </a:pPr>
                       <a:r>
-                        <a:rPr lang="de-DE" dirty="0"/>
+                        <a:rPr lang="de-DE" sz="1400" dirty="0"/>
                         <a:t>Konstruktion einer Windows-Exe, die die Anwendungslogik beinhaltet</a:t>
                       </a:r>
                     </a:p>
@@ -5441,7 +5458,7 @@
                         <a:buChar char="•"/>
                       </a:pPr>
                       <a:r>
-                        <a:rPr lang="de-DE" dirty="0"/>
+                        <a:rPr lang="de-DE" sz="1400" dirty="0"/>
                         <a:t>Viele Konfigurations-möglichkeiten</a:t>
                       </a:r>
                     </a:p>
@@ -5451,7 +5468,7 @@
                         <a:buChar char="•"/>
                       </a:pPr>
                       <a:r>
-                        <a:rPr lang="de-DE" dirty="0"/>
+                        <a:rPr lang="de-DE" sz="1400" dirty="0"/>
                         <a:t>Unterstützung vieler Pakete</a:t>
                       </a:r>
                     </a:p>
@@ -5461,11 +5478,11 @@
                         <a:buChar char="•"/>
                       </a:pPr>
                       <a:r>
-                        <a:rPr lang="de-DE" dirty="0" err="1"/>
+                        <a:rPr lang="de-DE" sz="1400" dirty="0" err="1"/>
                         <a:t>Anaconda</a:t>
                       </a:r>
                       <a:r>
-                        <a:rPr lang="de-DE" dirty="0"/>
+                        <a:rPr lang="de-DE" sz="1400" dirty="0"/>
                         <a:t> wird nicht benötigt</a:t>
                       </a:r>
                     </a:p>
@@ -5482,7 +5499,7 @@
                         <a:buChar char="•"/>
                       </a:pPr>
                       <a:r>
-                        <a:rPr lang="de-DE" dirty="0"/>
+                        <a:rPr lang="de-DE" sz="1400" dirty="0"/>
                         <a:t>Kompatibel auf vielen verschiedenen Systemen</a:t>
                       </a:r>
                     </a:p>
@@ -5492,8 +5509,69 @@
                         <a:buChar char="•"/>
                       </a:pPr>
                       <a:r>
-                        <a:rPr lang="de-DE" dirty="0"/>
+                        <a:rPr lang="de-DE" sz="1400" dirty="0"/>
                         <a:t>Updates leicht möglich</a:t>
+                      </a:r>
+                    </a:p>
+                  </a:txBody>
+                  <a:tcPr>
+                    <a:solidFill>
+                      <a:schemeClr val="accent1">
+                        <a:lumMod val="40000"/>
+                        <a:lumOff val="60000"/>
+                      </a:schemeClr>
+                    </a:solidFill>
+                  </a:tcPr>
+                </a:tc>
+                <a:tc>
+                  <a:txBody>
+                    <a:bodyPr/>
+                    <a:lstStyle/>
+                    <a:p>
+                      <a:pPr marL="285750" indent="-285750">
+                        <a:buFont typeface="Arial" panose="020B0604020202020204" pitchFamily="34" charset="0"/>
+                        <a:buChar char="•"/>
+                      </a:pPr>
+                      <a:r>
+                        <a:rPr lang="de-DE" sz="1400" dirty="0"/>
+                        <a:t>Erzeugung eines </a:t>
+                      </a:r>
+                      <a:r>
+                        <a:rPr lang="de-DE" sz="1400" dirty="0" err="1"/>
+                        <a:t>Builds</a:t>
+                      </a:r>
+                      <a:r>
+                        <a:rPr lang="de-DE" sz="1400" dirty="0"/>
+                        <a:t> als Binary oder eines </a:t>
+                      </a:r>
+                      <a:r>
+                        <a:rPr lang="de-DE" sz="1400" dirty="0" err="1"/>
+                        <a:t>Installers</a:t>
+                      </a:r>
+                      <a:endParaRPr lang="de-DE" sz="1400" dirty="0"/>
+                    </a:p>
+                    <a:p>
+                      <a:pPr marL="285750" indent="-285750">
+                        <a:buFont typeface="Arial" panose="020B0604020202020204" pitchFamily="34" charset="0"/>
+                        <a:buChar char="•"/>
+                      </a:pPr>
+                      <a:r>
+                        <a:rPr lang="de-DE" sz="1400" dirty="0" err="1"/>
+                        <a:t>Anaconda</a:t>
+                      </a:r>
+                      <a:r>
+                        <a:rPr lang="de-DE" sz="1400" dirty="0"/>
+                        <a:t> wird nicht benötigt</a:t>
+                      </a:r>
+                    </a:p>
+                    <a:p>
+                      <a:pPr marL="285750" indent="-285750">
+                        <a:buFont typeface="Arial" panose="020B0604020202020204" pitchFamily="34" charset="0"/>
+                        <a:buChar char="•"/>
+                      </a:pPr>
+                      <a:r>
+                        <a:rPr lang="de-DE" sz="1400" dirty="0"/>
+                        <a:t>Python wird mit ausgeliefert</a:t>
                       </a:r>
                     </a:p>
                   </a:txBody>
@@ -5519,7 +5597,7 @@
                     <a:lstStyle/>
                     <a:p>
                       <a:r>
-                        <a:rPr lang="de-DE" b="1" dirty="0"/>
+                        <a:rPr lang="de-DE" sz="1400" b="1" dirty="0"/>
                         <a:t>Nachteile</a:t>
                       </a:r>
                     </a:p>
@@ -5536,7 +5614,7 @@
                         <a:buChar char="•"/>
                       </a:pPr>
                       <a:r>
-                        <a:rPr lang="de-DE" dirty="0"/>
+                        <a:rPr lang="de-DE" sz="1400" dirty="0"/>
                         <a:t>Paketiert keine Anwendungslogik, nur das Environment</a:t>
                       </a:r>
                     </a:p>
@@ -5546,7 +5624,7 @@
                         <a:buChar char="•"/>
                       </a:pPr>
                       <a:r>
-                        <a:rPr lang="de-DE" dirty="0"/>
+                        <a:rPr lang="de-DE" sz="1400" dirty="0"/>
                         <a:t>Wenig Konfigurations-möglichkeiten</a:t>
                       </a:r>
                     </a:p>
@@ -5570,15 +5648,15 @@
                         <a:buChar char="•"/>
                       </a:pPr>
                       <a:r>
-                        <a:rPr lang="de-DE" dirty="0"/>
+                        <a:rPr lang="de-DE" sz="1400" dirty="0"/>
                         <a:t>Die meisten Pakete benötigen einen Hook, um mit </a:t>
                       </a:r>
                       <a:r>
-                        <a:rPr lang="de-DE" dirty="0" err="1"/>
+                        <a:rPr lang="de-DE" sz="1400" dirty="0" err="1"/>
                         <a:t>PyInstaller</a:t>
                       </a:r>
                       <a:r>
-                        <a:rPr lang="de-DE" dirty="0"/>
+                        <a:rPr lang="de-DE" sz="1400" dirty="0"/>
                         <a:t> zu funktionieren. Einige Hooks fehlen.</a:t>
                       </a:r>
                     </a:p>
@@ -5595,21 +5673,50 @@
                         <a:buChar char="•"/>
                       </a:pPr>
                       <a:r>
-                        <a:rPr lang="de-DE" dirty="0" err="1"/>
+                        <a:rPr lang="de-DE" sz="1400" dirty="0" err="1"/>
                         <a:t>Anaconda</a:t>
                       </a:r>
                       <a:r>
-                        <a:rPr lang="de-DE" dirty="0"/>
+                        <a:rPr lang="de-DE" sz="1400" dirty="0"/>
                         <a:t>/</a:t>
                       </a:r>
                       <a:r>
-                        <a:rPr lang="de-DE" dirty="0" err="1"/>
+                        <a:rPr lang="de-DE" sz="1400" dirty="0" err="1"/>
                         <a:t>Miniconda</a:t>
                       </a:r>
                       <a:r>
-                        <a:rPr lang="de-DE" dirty="0"/>
+                        <a:rPr lang="de-DE" sz="1400" dirty="0"/>
                         <a:t> muss separat installiert werden</a:t>
                       </a:r>
+                    </a:p>
+                  </a:txBody>
+                  <a:tcPr>
+                    <a:solidFill>
+                      <a:schemeClr val="accent1">
+                        <a:lumMod val="40000"/>
+                        <a:lumOff val="60000"/>
+                      </a:schemeClr>
+                    </a:solidFill>
+                  </a:tcPr>
+                </a:tc>
+                <a:tc>
+                  <a:txBody>
+                    <a:bodyPr/>
+                    <a:lstStyle/>
+                    <a:p>
+                      <a:pPr marL="285750" indent="-285750">
+                        <a:buFont typeface="Arial" panose="020B0604020202020204" pitchFamily="34" charset="0"/>
+                        <a:buChar char="•"/>
+                      </a:pPr>
+                      <a:r>
+                        <a:rPr lang="de-DE" sz="1400" dirty="0"/>
+                        <a:t>Einige Pakete sind nicht kompatibel und müssen manuell </a:t>
+                      </a:r>
+                      <a:r>
+                        <a:rPr lang="de-DE" sz="1400"/>
+                        <a:t>nachgepflegt werden</a:t>
+                      </a:r>
+                      <a:endParaRPr lang="de-DE" sz="1400" dirty="0"/>
                     </a:p>
                   </a:txBody>
                   <a:tcPr>

</xml_diff>